<commit_message>
adjusting the presentation and fixing spelling error in assignement 2a
</commit_message>
<xml_diff>
--- a/Presentations/3_26_20 Assignment 2A Presentation.pptx
+++ b/Presentations/3_26_20 Assignment 2A Presentation.pptx
@@ -5,13 +5,14 @@
     <p:sldMasterId id="2147483648" r:id="rId1"/>
   </p:sldMasterIdLst>
   <p:sldIdLst>
-    <p:sldId id="256" r:id="rId2"/>
-    <p:sldId id="260" r:id="rId3"/>
-    <p:sldId id="263" r:id="rId4"/>
-    <p:sldId id="264" r:id="rId5"/>
-    <p:sldId id="265" r:id="rId6"/>
-    <p:sldId id="262" r:id="rId7"/>
-    <p:sldId id="266" r:id="rId8"/>
+    <p:sldId id="278" r:id="rId2"/>
+    <p:sldId id="256" r:id="rId3"/>
+    <p:sldId id="260" r:id="rId4"/>
+    <p:sldId id="263" r:id="rId5"/>
+    <p:sldId id="264" r:id="rId6"/>
+    <p:sldId id="265" r:id="rId7"/>
+    <p:sldId id="262" r:id="rId8"/>
+    <p:sldId id="266" r:id="rId9"/>
   </p:sldIdLst>
   <p:sldSz cx="12192000" cy="6858000"/>
   <p:notesSz cx="6858000" cy="9144000"/>
@@ -3337,53 +3338,237 @@
           <p:cNvPr id="2" name="Title 1">
             <a:extLst>
               <a:ext uri="{FF2B5EF4-FFF2-40B4-BE49-F238E27FC236}">
-                <a16:creationId xmlns:a16="http://schemas.microsoft.com/office/drawing/2014/main" id="{5A84F521-E772-4045-AC01-ED3D39F83633}"/>
-              </a:ext>
-            </a:extLst>
-          </p:cNvPr>
-          <p:cNvSpPr>
-            <a:spLocks noGrp="1"/>
-          </p:cNvSpPr>
-          <p:nvPr>
-            <p:ph type="ctrTitle"/>
+                <a16:creationId xmlns:a16="http://schemas.microsoft.com/office/drawing/2014/main" id="{EE13D76D-32B2-4D05-BA82-A4212B9C58EF}"/>
+              </a:ext>
+            </a:extLst>
+          </p:cNvPr>
+          <p:cNvSpPr>
+            <a:spLocks noGrp="1"/>
+          </p:cNvSpPr>
+          <p:nvPr>
+            <p:ph type="title"/>
           </p:nvPr>
         </p:nvSpPr>
         <p:spPr>
           <a:xfrm>
-            <a:off x="1524000" y="2473691"/>
-            <a:ext cx="9144000" cy="1026645"/>
+            <a:off x="838200" y="452380"/>
+            <a:ext cx="10515600" cy="5953240"/>
           </a:xfrm>
         </p:spPr>
         <p:txBody>
-          <a:bodyPr/>
-          <a:lstStyle/>
-          <a:p>
-            <a:r>
+          <a:bodyPr>
+            <a:normAutofit/>
+          </a:bodyPr>
+          <a:lstStyle/>
+          <a:p>
+            <a:pPr algn="ctr"/>
+            <a:r>
+              <a:rPr lang="en-US" b="1" dirty="0">
+                <a:latin typeface="Arial" panose="020B0604020202020204" pitchFamily="34" charset="0"/>
+              </a:rPr>
+              <a:t>Assignment 2A Presentation</a:t>
+            </a:r>
+            <a:br>
+              <a:rPr lang="en-US" dirty="0">
+                <a:latin typeface="Arial" panose="020B0604020202020204" pitchFamily="34" charset="0"/>
+              </a:rPr>
+            </a:br>
+            <a:r>
+              <a:rPr lang="en-US" dirty="0">
+                <a:latin typeface="Arial" panose="020B0604020202020204" pitchFamily="34" charset="0"/>
+              </a:rPr>
+              <a:t>EECE 443</a:t>
+            </a:r>
+            <a:br>
+              <a:rPr lang="en-US" dirty="0">
+                <a:latin typeface="Arial" panose="020B0604020202020204" pitchFamily="34" charset="0"/>
+              </a:rPr>
+            </a:br>
+            <a:br>
+              <a:rPr lang="en-US" dirty="0">
+                <a:latin typeface="Arial" panose="020B0604020202020204" pitchFamily="34" charset="0"/>
+              </a:rPr>
+            </a:br>
+            <a:r>
+              <a:rPr lang="en-US" dirty="0">
+                <a:latin typeface="Arial" panose="020B0604020202020204" pitchFamily="34" charset="0"/>
+              </a:rPr>
+              <a:t>Team 2: MCU TNC Design</a:t>
+            </a:r>
+            <a:br>
               <a:rPr lang="en-US" dirty="0"/>
-              <a:t>MCU TNC Assignment 1A</a:t>
-            </a:r>
-          </a:p>
-        </p:txBody>
-      </p:sp>
-      <p:sp>
-        <p:nvSpPr>
-          <p:cNvPr id="3" name="Subtitle 2">
-            <a:extLst>
-              <a:ext uri="{FF2B5EF4-FFF2-40B4-BE49-F238E27FC236}">
-                <a16:creationId xmlns:a16="http://schemas.microsoft.com/office/drawing/2014/main" id="{35017881-51EA-47D2-A657-20BA4CE88E85}"/>
-              </a:ext>
-            </a:extLst>
-          </p:cNvPr>
-          <p:cNvSpPr>
-            <a:spLocks noGrp="1"/>
-          </p:cNvSpPr>
-          <p:nvPr>
-            <p:ph type="subTitle" idx="1"/>
+            </a:br>
+            <a:r>
+              <a:rPr lang="en-US" dirty="0">
+                <a:effectLst/>
+                <a:latin typeface="Arial" panose="020B0604020202020204" pitchFamily="34" charset="0"/>
+              </a:rPr>
+              <a:t>Kaleb Leon – C00094357</a:t>
+            </a:r>
+            <a:br>
+              <a:rPr lang="en-US" dirty="0">
+                <a:effectLst/>
+                <a:latin typeface="Arial" panose="020B0604020202020204" pitchFamily="34" charset="0"/>
+              </a:rPr>
+            </a:br>
+            <a:r>
+              <a:rPr lang="en-US" dirty="0">
+                <a:effectLst/>
+                <a:latin typeface="Arial" panose="020B0604020202020204" pitchFamily="34" charset="0"/>
+              </a:rPr>
+              <a:t>Kobe Keopraseuth – C00092349</a:t>
+            </a:r>
+            <a:br>
+              <a:rPr lang="en-US" dirty="0">
+                <a:effectLst/>
+                <a:latin typeface="Arial" panose="020B0604020202020204" pitchFamily="34" charset="0"/>
+              </a:rPr>
+            </a:br>
+            <a:r>
+              <a:rPr lang="en-US" dirty="0">
+                <a:effectLst/>
+                <a:latin typeface="Arial" panose="020B0604020202020204" pitchFamily="34" charset="0"/>
+              </a:rPr>
+              <a:t>David Cain – C00043561</a:t>
+            </a:r>
+            <a:br>
+              <a:rPr lang="en-US" dirty="0">
+                <a:effectLst/>
+                <a:latin typeface="Arial" panose="020B0604020202020204" pitchFamily="34" charset="0"/>
+              </a:rPr>
+            </a:br>
+            <a:br>
+              <a:rPr lang="en-US" dirty="0">
+                <a:effectLst/>
+                <a:latin typeface="Arial" panose="020B0604020202020204" pitchFamily="34" charset="0"/>
+              </a:rPr>
+            </a:br>
+            <a:r>
+              <a:rPr lang="en-US" dirty="0">
+                <a:effectLst/>
+                <a:latin typeface="Arial" panose="020B0604020202020204" pitchFamily="34" charset="0"/>
+              </a:rPr>
+              <a:t>March </a:t>
+            </a:r>
+            <a:r>
+              <a:rPr lang="en-US" dirty="0">
+                <a:latin typeface="Arial" panose="020B0604020202020204" pitchFamily="34" charset="0"/>
+              </a:rPr>
+              <a:t>26</a:t>
+            </a:r>
+            <a:r>
+              <a:rPr lang="en-US" baseline="30000" dirty="0">
+                <a:effectLst/>
+                <a:latin typeface="Arial" panose="020B0604020202020204" pitchFamily="34" charset="0"/>
+              </a:rPr>
+              <a:t>th</a:t>
+            </a:r>
+            <a:r>
+              <a:rPr lang="en-US" dirty="0">
+                <a:effectLst/>
+                <a:latin typeface="Arial" panose="020B0604020202020204" pitchFamily="34" charset="0"/>
+              </a:rPr>
+              <a:t>, 2020</a:t>
+            </a:r>
+            <a:endParaRPr lang="en-US" dirty="0"/>
+          </a:p>
+        </p:txBody>
+      </p:sp>
+    </p:spTree>
+    <p:extLst>
+      <p:ext uri="{BB962C8B-B14F-4D97-AF65-F5344CB8AC3E}">
+        <p14:creationId xmlns:p14="http://schemas.microsoft.com/office/powerpoint/2010/main" val="4222426619"/>
+      </p:ext>
+    </p:extLst>
+  </p:cSld>
+  <p:clrMapOvr>
+    <a:masterClrMapping/>
+  </p:clrMapOvr>
+</p:sld>
+</file>
+
+<file path=ppt/slides/slide2.xml><?xml version="1.0" encoding="utf-8"?>
+<p:sld xmlns:a="http://schemas.openxmlformats.org/drawingml/2006/main" xmlns:r="http://schemas.openxmlformats.org/officeDocument/2006/relationships" xmlns:p="http://schemas.openxmlformats.org/presentationml/2006/main">
+  <p:cSld>
+    <p:spTree>
+      <p:nvGrpSpPr>
+        <p:cNvPr id="1" name=""/>
+        <p:cNvGrpSpPr/>
+        <p:nvPr/>
+      </p:nvGrpSpPr>
+      <p:grpSpPr>
+        <a:xfrm>
+          <a:off x="0" y="0"/>
+          <a:ext cx="0" cy="0"/>
+          <a:chOff x="0" y="0"/>
+          <a:chExt cx="0" cy="0"/>
+        </a:xfrm>
+      </p:grpSpPr>
+      <p:sp>
+        <p:nvSpPr>
+          <p:cNvPr id="2" name="Title 1">
+            <a:extLst>
+              <a:ext uri="{FF2B5EF4-FFF2-40B4-BE49-F238E27FC236}">
+                <a16:creationId xmlns:a16="http://schemas.microsoft.com/office/drawing/2014/main" id="{5A84F521-E772-4045-AC01-ED3D39F83633}"/>
+              </a:ext>
+            </a:extLst>
+          </p:cNvPr>
+          <p:cNvSpPr>
+            <a:spLocks noGrp="1"/>
+          </p:cNvSpPr>
+          <p:nvPr>
+            <p:ph type="ctrTitle"/>
           </p:nvPr>
         </p:nvSpPr>
         <p:spPr>
           <a:xfrm>
-            <a:off x="1524000" y="3611663"/>
+            <a:off x="1524000" y="1881702"/>
+            <a:ext cx="9144000" cy="3094596"/>
+          </a:xfrm>
+        </p:spPr>
+        <p:txBody>
+          <a:bodyPr>
+            <a:normAutofit fontScale="90000"/>
+          </a:bodyPr>
+          <a:lstStyle/>
+          <a:p>
+            <a:r>
+              <a:rPr lang="en-US" dirty="0"/>
+              <a:t>MCU TNC Assignment 2A</a:t>
+            </a:r>
+            <a:br>
+              <a:rPr lang="en-US" dirty="0"/>
+            </a:br>
+            <a:r>
+              <a:rPr lang="en-US" dirty="0"/>
+              <a:t>Peer Review of Team 1: Package Delivery Robot</a:t>
+            </a:r>
+            <a:br>
+              <a:rPr lang="en-US" dirty="0"/>
+            </a:br>
+            <a:endParaRPr lang="en-US" dirty="0"/>
+          </a:p>
+        </p:txBody>
+      </p:sp>
+      <p:sp>
+        <p:nvSpPr>
+          <p:cNvPr id="3" name="Subtitle 2">
+            <a:extLst>
+              <a:ext uri="{FF2B5EF4-FFF2-40B4-BE49-F238E27FC236}">
+                <a16:creationId xmlns:a16="http://schemas.microsoft.com/office/drawing/2014/main" id="{35017881-51EA-47D2-A657-20BA4CE88E85}"/>
+              </a:ext>
+            </a:extLst>
+          </p:cNvPr>
+          <p:cNvSpPr>
+            <a:spLocks noGrp="1"/>
+          </p:cNvSpPr>
+          <p:nvPr>
+            <p:ph type="subTitle" idx="1"/>
+          </p:nvPr>
+        </p:nvSpPr>
+        <p:spPr>
+          <a:xfrm>
+            <a:off x="1524000" y="4839962"/>
             <a:ext cx="9144000" cy="469449"/>
           </a:xfrm>
         </p:spPr>
@@ -3411,7 +3596,7 @@
 </p:sld>
 </file>
 
-<file path=ppt/slides/slide2.xml><?xml version="1.0" encoding="utf-8"?>
+<file path=ppt/slides/slide3.xml><?xml version="1.0" encoding="utf-8"?>
 <p:sld xmlns:a="http://schemas.openxmlformats.org/drawingml/2006/main" xmlns:r="http://schemas.openxmlformats.org/officeDocument/2006/relationships" xmlns:p="http://schemas.openxmlformats.org/presentationml/2006/main">
   <p:cSld>
     <p:spTree>
@@ -3772,7 +3957,7 @@
 </p:sld>
 </file>
 
-<file path=ppt/slides/slide3.xml><?xml version="1.0" encoding="utf-8"?>
+<file path=ppt/slides/slide4.xml><?xml version="1.0" encoding="utf-8"?>
 <p:sld xmlns:a="http://schemas.openxmlformats.org/drawingml/2006/main" xmlns:r="http://schemas.openxmlformats.org/officeDocument/2006/relationships" xmlns:p="http://schemas.openxmlformats.org/presentationml/2006/main">
   <p:cSld>
     <p:spTree>
@@ -3941,7 +4126,7 @@
 </p:sld>
 </file>
 
-<file path=ppt/slides/slide4.xml><?xml version="1.0" encoding="utf-8"?>
+<file path=ppt/slides/slide5.xml><?xml version="1.0" encoding="utf-8"?>
 <p:sld xmlns:a="http://schemas.openxmlformats.org/drawingml/2006/main" xmlns:r="http://schemas.openxmlformats.org/officeDocument/2006/relationships" xmlns:p="http://schemas.openxmlformats.org/presentationml/2006/main">
   <p:cSld>
     <p:spTree>
@@ -4465,7 +4650,7 @@
 </p:sld>
 </file>
 
-<file path=ppt/slides/slide5.xml><?xml version="1.0" encoding="utf-8"?>
+<file path=ppt/slides/slide6.xml><?xml version="1.0" encoding="utf-8"?>
 <p:sld xmlns:a="http://schemas.openxmlformats.org/drawingml/2006/main" xmlns:r="http://schemas.openxmlformats.org/officeDocument/2006/relationships" xmlns:p="http://schemas.openxmlformats.org/presentationml/2006/main">
   <p:cSld>
     <p:spTree>
@@ -4634,7 +4819,7 @@
 </p:sld>
 </file>
 
-<file path=ppt/slides/slide6.xml><?xml version="1.0" encoding="utf-8"?>
+<file path=ppt/slides/slide7.xml><?xml version="1.0" encoding="utf-8"?>
 <p:sld xmlns:a="http://schemas.openxmlformats.org/drawingml/2006/main" xmlns:r="http://schemas.openxmlformats.org/officeDocument/2006/relationships" xmlns:p="http://schemas.openxmlformats.org/presentationml/2006/main">
   <p:cSld>
     <p:spTree>
@@ -4772,7 +4957,7 @@
 </p:sld>
 </file>
 
-<file path=ppt/slides/slide7.xml><?xml version="1.0" encoding="utf-8"?>
+<file path=ppt/slides/slide8.xml><?xml version="1.0" encoding="utf-8"?>
 <p:sld xmlns:a="http://schemas.openxmlformats.org/drawingml/2006/main" xmlns:r="http://schemas.openxmlformats.org/officeDocument/2006/relationships" xmlns:p="http://schemas.openxmlformats.org/presentationml/2006/main">
   <p:cSld>
     <p:spTree>

</xml_diff>